<commit_message>
Update the figure of softwarestack
</commit_message>
<xml_diff>
--- a/figure/softwarestack.pptx
+++ b/figure/softwarestack.pptx
@@ -1012,7 +1012,7 @@
           <a:p>
             <a:fld id="{E90ED720-0104-4369-84BC-D37694168613}" type="datetimeFigureOut">
               <a:rPr kumimoji="1" lang="ja-JP" altLang="en-US" smtClean="0"/>
-              <a:t>2017/4/7</a:t>
+              <a:t>2017/6/25</a:t>
             </a:fld>
             <a:endParaRPr kumimoji="1" lang="ja-JP" altLang="en-US"/>
           </a:p>
@@ -1214,7 +1214,7 @@
           <a:p>
             <a:fld id="{E90ED720-0104-4369-84BC-D37694168613}" type="datetimeFigureOut">
               <a:rPr kumimoji="1" lang="ja-JP" altLang="en-US" smtClean="0"/>
-              <a:t>2017/4/7</a:t>
+              <a:t>2017/6/25</a:t>
             </a:fld>
             <a:endParaRPr kumimoji="1" lang="ja-JP" altLang="en-US"/>
           </a:p>
@@ -1426,7 +1426,7 @@
           <a:p>
             <a:fld id="{E90ED720-0104-4369-84BC-D37694168613}" type="datetimeFigureOut">
               <a:rPr kumimoji="1" lang="ja-JP" altLang="en-US" smtClean="0"/>
-              <a:t>2017/4/7</a:t>
+              <a:t>2017/6/25</a:t>
             </a:fld>
             <a:endParaRPr kumimoji="1" lang="ja-JP" altLang="en-US"/>
           </a:p>
@@ -1628,7 +1628,7 @@
           <a:p>
             <a:fld id="{E90ED720-0104-4369-84BC-D37694168613}" type="datetimeFigureOut">
               <a:rPr kumimoji="1" lang="ja-JP" altLang="en-US" smtClean="0"/>
-              <a:t>2017/4/7</a:t>
+              <a:t>2017/6/25</a:t>
             </a:fld>
             <a:endParaRPr kumimoji="1" lang="ja-JP" altLang="en-US"/>
           </a:p>
@@ -1874,7 +1874,7 @@
           <a:p>
             <a:fld id="{E90ED720-0104-4369-84BC-D37694168613}" type="datetimeFigureOut">
               <a:rPr kumimoji="1" lang="ja-JP" altLang="en-US" smtClean="0"/>
-              <a:t>2017/4/7</a:t>
+              <a:t>2017/6/25</a:t>
             </a:fld>
             <a:endParaRPr kumimoji="1" lang="ja-JP" altLang="en-US"/>
           </a:p>
@@ -2226,7 +2226,7 @@
           <a:p>
             <a:fld id="{E90ED720-0104-4369-84BC-D37694168613}" type="datetimeFigureOut">
               <a:rPr kumimoji="1" lang="ja-JP" altLang="en-US" smtClean="0"/>
-              <a:t>2017/4/7</a:t>
+              <a:t>2017/6/25</a:t>
             </a:fld>
             <a:endParaRPr kumimoji="1" lang="ja-JP" altLang="en-US"/>
           </a:p>
@@ -2712,7 +2712,7 @@
           <a:p>
             <a:fld id="{E90ED720-0104-4369-84BC-D37694168613}" type="datetimeFigureOut">
               <a:rPr kumimoji="1" lang="ja-JP" altLang="en-US" smtClean="0"/>
-              <a:t>2017/4/7</a:t>
+              <a:t>2017/6/25</a:t>
             </a:fld>
             <a:endParaRPr kumimoji="1" lang="ja-JP" altLang="en-US"/>
           </a:p>
@@ -2830,7 +2830,7 @@
           <a:p>
             <a:fld id="{E90ED720-0104-4369-84BC-D37694168613}" type="datetimeFigureOut">
               <a:rPr kumimoji="1" lang="ja-JP" altLang="en-US" smtClean="0"/>
-              <a:t>2017/4/7</a:t>
+              <a:t>2017/6/25</a:t>
             </a:fld>
             <a:endParaRPr kumimoji="1" lang="ja-JP" altLang="en-US"/>
           </a:p>
@@ -2925,7 +2925,7 @@
           <a:p>
             <a:fld id="{E90ED720-0104-4369-84BC-D37694168613}" type="datetimeFigureOut">
               <a:rPr kumimoji="1" lang="ja-JP" altLang="en-US" smtClean="0"/>
-              <a:t>2017/4/7</a:t>
+              <a:t>2017/6/25</a:t>
             </a:fld>
             <a:endParaRPr kumimoji="1" lang="ja-JP" altLang="en-US"/>
           </a:p>
@@ -3234,7 +3234,7 @@
           <a:p>
             <a:fld id="{E90ED720-0104-4369-84BC-D37694168613}" type="datetimeFigureOut">
               <a:rPr kumimoji="1" lang="ja-JP" altLang="en-US" smtClean="0"/>
-              <a:t>2017/4/7</a:t>
+              <a:t>2017/6/25</a:t>
             </a:fld>
             <a:endParaRPr kumimoji="1" lang="ja-JP" altLang="en-US"/>
           </a:p>
@@ -3487,7 +3487,7 @@
           <a:p>
             <a:fld id="{E90ED720-0104-4369-84BC-D37694168613}" type="datetimeFigureOut">
               <a:rPr kumimoji="1" lang="ja-JP" altLang="en-US" smtClean="0"/>
-              <a:t>2017/4/7</a:t>
+              <a:t>2017/6/25</a:t>
             </a:fld>
             <a:endParaRPr kumimoji="1" lang="ja-JP" altLang="en-US"/>
           </a:p>
@@ -3732,7 +3732,7 @@
           <a:p>
             <a:fld id="{E90ED720-0104-4369-84BC-D37694168613}" type="datetimeFigureOut">
               <a:rPr kumimoji="1" lang="ja-JP" altLang="en-US" smtClean="0"/>
-              <a:t>2017/4/7</a:t>
+              <a:t>2017/6/25</a:t>
             </a:fld>
             <a:endParaRPr kumimoji="1" lang="ja-JP" altLang="en-US"/>
           </a:p>
@@ -4557,7 +4557,14 @@
                 <a:latin typeface="Segoe UI"/>
                 <a:ea typeface="ＭＳ Ｐゴシック" panose="020B0600070205080204" pitchFamily="50" charset="-128"/>
               </a:rPr>
-              <a:t>I/O Cluster #0-1</a:t>
+              <a:t>I/O Cluster </a:t>
+            </a:r>
+            <a:r>
+              <a:rPr kumimoji="0" lang="en-US" altLang="ja-JP" sz="2000" kern="0" dirty="0" smtClean="0">
+                <a:latin typeface="Segoe UI"/>
+                <a:ea typeface="ＭＳ Ｐゴシック" panose="020B0600070205080204" pitchFamily="50" charset="-128"/>
+              </a:rPr>
+              <a:t>#0-1</a:t>
             </a:r>
             <a:endParaRPr kumimoji="0" lang="ja-JP" altLang="en-US" sz="2000" kern="0" dirty="0">
               <a:latin typeface="Segoe UI"/>
@@ -4810,7 +4817,14 @@
                 <a:latin typeface="Segoe UI"/>
                 <a:ea typeface="ＭＳ Ｐゴシック" panose="020B0600070205080204" pitchFamily="50" charset="-128"/>
               </a:rPr>
-              <a:t>Compute Cluster #0-15 </a:t>
+              <a:t>Compute Cluster </a:t>
+            </a:r>
+            <a:r>
+              <a:rPr kumimoji="0" lang="en-US" altLang="ja-JP" sz="2000" kern="0" dirty="0" smtClean="0">
+                <a:latin typeface="Segoe UI"/>
+                <a:ea typeface="ＭＳ Ｐゴシック" panose="020B0600070205080204" pitchFamily="50" charset="-128"/>
+              </a:rPr>
+              <a:t>#1-16 </a:t>
             </a:r>
             <a:endParaRPr kumimoji="0" lang="ja-JP" altLang="en-US" sz="2000" kern="0" dirty="0">
               <a:latin typeface="Segoe UI"/>

</xml_diff>